<commit_message>
edit word and ppt
not yet
</commit_message>
<xml_diff>
--- a/datawarehouse.pptx
+++ b/datawarehouse.pptx
@@ -11,9 +11,11 @@
     <p:sldId id="258" r:id="rId5"/>
     <p:sldId id="259" r:id="rId6"/>
     <p:sldId id="263" r:id="rId7"/>
-    <p:sldId id="260" r:id="rId8"/>
-    <p:sldId id="261" r:id="rId9"/>
-    <p:sldId id="262" r:id="rId10"/>
+    <p:sldId id="265" r:id="rId8"/>
+    <p:sldId id="266" r:id="rId9"/>
+    <p:sldId id="260" r:id="rId10"/>
+    <p:sldId id="261" r:id="rId11"/>
+    <p:sldId id="262" r:id="rId12"/>
   </p:sldIdLst>
   <p:sldSz cx="12192000" cy="6858000"/>
   <p:notesSz cx="6858000" cy="9144000"/>
@@ -251,7 +253,7 @@
           <a:p>
             <a:fld id="{71CC5227-3D46-4619-88EC-F263E49CE6A7}" type="datetimeFigureOut">
               <a:rPr lang="en-SG" smtClean="0"/>
-              <a:t>17/11/2022</a:t>
+              <a:t>20/11/2022</a:t>
             </a:fld>
             <a:endParaRPr lang="en-SG"/>
           </a:p>
@@ -421,7 +423,7 @@
           <a:p>
             <a:fld id="{71CC5227-3D46-4619-88EC-F263E49CE6A7}" type="datetimeFigureOut">
               <a:rPr lang="en-SG" smtClean="0"/>
-              <a:t>17/11/2022</a:t>
+              <a:t>20/11/2022</a:t>
             </a:fld>
             <a:endParaRPr lang="en-SG"/>
           </a:p>
@@ -601,7 +603,7 @@
           <a:p>
             <a:fld id="{71CC5227-3D46-4619-88EC-F263E49CE6A7}" type="datetimeFigureOut">
               <a:rPr lang="en-SG" smtClean="0"/>
-              <a:t>17/11/2022</a:t>
+              <a:t>20/11/2022</a:t>
             </a:fld>
             <a:endParaRPr lang="en-SG"/>
           </a:p>
@@ -771,7 +773,7 @@
           <a:p>
             <a:fld id="{71CC5227-3D46-4619-88EC-F263E49CE6A7}" type="datetimeFigureOut">
               <a:rPr lang="en-SG" smtClean="0"/>
-              <a:t>17/11/2022</a:t>
+              <a:t>20/11/2022</a:t>
             </a:fld>
             <a:endParaRPr lang="en-SG"/>
           </a:p>
@@ -1017,7 +1019,7 @@
           <a:p>
             <a:fld id="{71CC5227-3D46-4619-88EC-F263E49CE6A7}" type="datetimeFigureOut">
               <a:rPr lang="en-SG" smtClean="0"/>
-              <a:t>17/11/2022</a:t>
+              <a:t>20/11/2022</a:t>
             </a:fld>
             <a:endParaRPr lang="en-SG"/>
           </a:p>
@@ -1249,7 +1251,7 @@
           <a:p>
             <a:fld id="{71CC5227-3D46-4619-88EC-F263E49CE6A7}" type="datetimeFigureOut">
               <a:rPr lang="en-SG" smtClean="0"/>
-              <a:t>17/11/2022</a:t>
+              <a:t>20/11/2022</a:t>
             </a:fld>
             <a:endParaRPr lang="en-SG"/>
           </a:p>
@@ -1616,7 +1618,7 @@
           <a:p>
             <a:fld id="{71CC5227-3D46-4619-88EC-F263E49CE6A7}" type="datetimeFigureOut">
               <a:rPr lang="en-SG" smtClean="0"/>
-              <a:t>17/11/2022</a:t>
+              <a:t>20/11/2022</a:t>
             </a:fld>
             <a:endParaRPr lang="en-SG"/>
           </a:p>
@@ -1734,7 +1736,7 @@
           <a:p>
             <a:fld id="{71CC5227-3D46-4619-88EC-F263E49CE6A7}" type="datetimeFigureOut">
               <a:rPr lang="en-SG" smtClean="0"/>
-              <a:t>17/11/2022</a:t>
+              <a:t>20/11/2022</a:t>
             </a:fld>
             <a:endParaRPr lang="en-SG"/>
           </a:p>
@@ -1829,7 +1831,7 @@
           <a:p>
             <a:fld id="{71CC5227-3D46-4619-88EC-F263E49CE6A7}" type="datetimeFigureOut">
               <a:rPr lang="en-SG" smtClean="0"/>
-              <a:t>17/11/2022</a:t>
+              <a:t>20/11/2022</a:t>
             </a:fld>
             <a:endParaRPr lang="en-SG"/>
           </a:p>
@@ -2106,7 +2108,7 @@
           <a:p>
             <a:fld id="{71CC5227-3D46-4619-88EC-F263E49CE6A7}" type="datetimeFigureOut">
               <a:rPr lang="en-SG" smtClean="0"/>
-              <a:t>17/11/2022</a:t>
+              <a:t>20/11/2022</a:t>
             </a:fld>
             <a:endParaRPr lang="en-SG"/>
           </a:p>
@@ -2359,7 +2361,7 @@
           <a:p>
             <a:fld id="{71CC5227-3D46-4619-88EC-F263E49CE6A7}" type="datetimeFigureOut">
               <a:rPr lang="en-SG" smtClean="0"/>
-              <a:t>17/11/2022</a:t>
+              <a:t>20/11/2022</a:t>
             </a:fld>
             <a:endParaRPr lang="en-SG"/>
           </a:p>
@@ -2572,7 +2574,7 @@
           <a:p>
             <a:fld id="{71CC5227-3D46-4619-88EC-F263E49CE6A7}" type="datetimeFigureOut">
               <a:rPr lang="en-SG" smtClean="0"/>
-              <a:t>17/11/2022</a:t>
+              <a:t>20/11/2022</a:t>
             </a:fld>
             <a:endParaRPr lang="en-SG"/>
           </a:p>
@@ -3005,14 +3007,7 @@
                 <a:latin typeface="Arial" panose="020B0604020202020204" pitchFamily="34" charset="0"/>
                 <a:cs typeface="Arial" panose="020B0604020202020204" pitchFamily="34" charset="0"/>
               </a:rPr>
-              <a:t>Môn: </a:t>
-            </a:r>
-            <a:r>
-              <a:rPr lang="en-SG" sz="3600" dirty="0" smtClean="0">
-                <a:latin typeface="Arial" panose="020B0604020202020204" pitchFamily="34" charset="0"/>
-                <a:cs typeface="Arial" panose="020B0604020202020204" pitchFamily="34" charset="0"/>
-              </a:rPr>
-              <a:t>Data Warehouse</a:t>
+              <a:t>Môn: Data Warehouse</a:t>
             </a:r>
             <a:br>
               <a:rPr lang="en-SG" sz="3600" dirty="0" smtClean="0">
@@ -3026,13 +3021,6 @@
                 <a:cs typeface="Arial" panose="020B0604020202020204" pitchFamily="34" charset="0"/>
               </a:rPr>
               <a:t>Giảng viên: Nguyễn Công Đức Song</a:t>
-            </a:r>
-            <a:r>
-              <a:rPr lang="en-SG" sz="3600" dirty="0" smtClean="0">
-                <a:latin typeface="Arial" panose="020B0604020202020204" pitchFamily="34" charset="0"/>
-                <a:cs typeface="Arial" panose="020B0604020202020204" pitchFamily="34" charset="0"/>
-              </a:rPr>
-              <a:t/>
             </a:r>
             <a:br>
               <a:rPr lang="en-SG" sz="3600" dirty="0" smtClean="0">
@@ -3107,35 +3095,7 @@
                 <a:latin typeface="Arial" panose="020B0604020202020204" pitchFamily="34" charset="0"/>
                 <a:cs typeface="Arial" panose="020B0604020202020204" pitchFamily="34" charset="0"/>
               </a:rPr>
-              <a:t>Chủ </a:t>
-            </a:r>
-            <a:r>
-              <a:rPr lang="en-SG" sz="4400" b="1" dirty="0" smtClean="0">
-                <a:effectLst>
-                  <a:outerShdw blurRad="38100" dist="38100" dir="2700000" algn="tl">
-                    <a:srgbClr val="000000">
-                      <a:alpha val="43137"/>
-                    </a:srgbClr>
-                  </a:outerShdw>
-                </a:effectLst>
-                <a:latin typeface="Arial" panose="020B0604020202020204" pitchFamily="34" charset="0"/>
-                <a:cs typeface="Arial" panose="020B0604020202020204" pitchFamily="34" charset="0"/>
-              </a:rPr>
-              <a:t>đề: KIỂM </a:t>
-            </a:r>
-            <a:r>
-              <a:rPr lang="en-SG" sz="4400" b="1" dirty="0" smtClean="0">
-                <a:effectLst>
-                  <a:outerShdw blurRad="38100" dist="38100" dir="2700000" algn="tl">
-                    <a:srgbClr val="000000">
-                      <a:alpha val="43137"/>
-                    </a:srgbClr>
-                  </a:outerShdw>
-                </a:effectLst>
-                <a:latin typeface="Arial" panose="020B0604020202020204" pitchFamily="34" charset="0"/>
-                <a:cs typeface="Arial" panose="020B0604020202020204" pitchFamily="34" charset="0"/>
-              </a:rPr>
-              <a:t>TRA XỔ SỐ</a:t>
+              <a:t>Chủ đề: KIỂM TRA XỔ SỐ</a:t>
             </a:r>
             <a:endParaRPr lang="en-SG" sz="4400" b="1" dirty="0">
               <a:effectLst>
@@ -3278,6 +3238,546 @@
       </p:par>
     </p:tnLst>
   </p:timing>
+</p:sld>
+</file>
+
+<file path=ppt/slides/slide10.xml><?xml version="1.0" encoding="utf-8"?>
+<p:sld xmlns:a="http://schemas.openxmlformats.org/drawingml/2006/main" xmlns:r="http://schemas.openxmlformats.org/officeDocument/2006/relationships" xmlns:p="http://schemas.openxmlformats.org/presentationml/2006/main">
+  <p:cSld>
+    <p:spTree>
+      <p:nvGrpSpPr>
+        <p:cNvPr id="1" name=""/>
+        <p:cNvGrpSpPr/>
+        <p:nvPr/>
+      </p:nvGrpSpPr>
+      <p:grpSpPr>
+        <a:xfrm>
+          <a:off x="0" y="0"/>
+          <a:ext cx="0" cy="0"/>
+          <a:chOff x="0" y="0"/>
+          <a:chExt cx="0" cy="0"/>
+        </a:xfrm>
+      </p:grpSpPr>
+      <p:sp>
+        <p:nvSpPr>
+          <p:cNvPr id="3" name="Subtitle 2"/>
+          <p:cNvSpPr txBox="1">
+            <a:spLocks/>
+          </p:cNvSpPr>
+          <p:nvPr/>
+        </p:nvSpPr>
+        <p:spPr>
+          <a:xfrm>
+            <a:off x="152398" y="198436"/>
+            <a:ext cx="7698511" cy="466582"/>
+          </a:xfrm>
+          <a:prstGeom prst="rect">
+            <a:avLst/>
+          </a:prstGeom>
+        </p:spPr>
+        <p:txBody>
+          <a:bodyPr vert="horz" lIns="91440" tIns="45720" rIns="91440" bIns="45720" rtlCol="0">
+            <a:normAutofit lnSpcReduction="10000"/>
+          </a:bodyPr>
+          <a:lstStyle>
+            <a:lvl1pPr marL="228600" indent="-228600" algn="l" defTabSz="914400" rtl="0" eaLnBrk="1" latinLnBrk="0" hangingPunct="1">
+              <a:lnSpc>
+                <a:spcPct val="90000"/>
+              </a:lnSpc>
+              <a:spcBef>
+                <a:spcPts val="1000"/>
+              </a:spcBef>
+              <a:buFont typeface="Arial" panose="020B0604020202020204" pitchFamily="34" charset="0"/>
+              <a:buChar char="•"/>
+              <a:defRPr sz="2800" kern="1200">
+                <a:solidFill>
+                  <a:schemeClr val="tx1"/>
+                </a:solidFill>
+                <a:latin typeface="+mn-lt"/>
+                <a:ea typeface="+mn-ea"/>
+                <a:cs typeface="+mn-cs"/>
+              </a:defRPr>
+            </a:lvl1pPr>
+            <a:lvl2pPr marL="685800" indent="-228600" algn="l" defTabSz="914400" rtl="0" eaLnBrk="1" latinLnBrk="0" hangingPunct="1">
+              <a:lnSpc>
+                <a:spcPct val="90000"/>
+              </a:lnSpc>
+              <a:spcBef>
+                <a:spcPts val="500"/>
+              </a:spcBef>
+              <a:buFont typeface="Arial" panose="020B0604020202020204" pitchFamily="34" charset="0"/>
+              <a:buChar char="•"/>
+              <a:defRPr sz="2400" kern="1200">
+                <a:solidFill>
+                  <a:schemeClr val="tx1"/>
+                </a:solidFill>
+                <a:latin typeface="+mn-lt"/>
+                <a:ea typeface="+mn-ea"/>
+                <a:cs typeface="+mn-cs"/>
+              </a:defRPr>
+            </a:lvl2pPr>
+            <a:lvl3pPr marL="1143000" indent="-228600" algn="l" defTabSz="914400" rtl="0" eaLnBrk="1" latinLnBrk="0" hangingPunct="1">
+              <a:lnSpc>
+                <a:spcPct val="90000"/>
+              </a:lnSpc>
+              <a:spcBef>
+                <a:spcPts val="500"/>
+              </a:spcBef>
+              <a:buFont typeface="Arial" panose="020B0604020202020204" pitchFamily="34" charset="0"/>
+              <a:buChar char="•"/>
+              <a:defRPr sz="2000" kern="1200">
+                <a:solidFill>
+                  <a:schemeClr val="tx1"/>
+                </a:solidFill>
+                <a:latin typeface="+mn-lt"/>
+                <a:ea typeface="+mn-ea"/>
+                <a:cs typeface="+mn-cs"/>
+              </a:defRPr>
+            </a:lvl3pPr>
+            <a:lvl4pPr marL="1600200" indent="-228600" algn="l" defTabSz="914400" rtl="0" eaLnBrk="1" latinLnBrk="0" hangingPunct="1">
+              <a:lnSpc>
+                <a:spcPct val="90000"/>
+              </a:lnSpc>
+              <a:spcBef>
+                <a:spcPts val="500"/>
+              </a:spcBef>
+              <a:buFont typeface="Arial" panose="020B0604020202020204" pitchFamily="34" charset="0"/>
+              <a:buChar char="•"/>
+              <a:defRPr sz="1800" kern="1200">
+                <a:solidFill>
+                  <a:schemeClr val="tx1"/>
+                </a:solidFill>
+                <a:latin typeface="+mn-lt"/>
+                <a:ea typeface="+mn-ea"/>
+                <a:cs typeface="+mn-cs"/>
+              </a:defRPr>
+            </a:lvl4pPr>
+            <a:lvl5pPr marL="2057400" indent="-228600" algn="l" defTabSz="914400" rtl="0" eaLnBrk="1" latinLnBrk="0" hangingPunct="1">
+              <a:lnSpc>
+                <a:spcPct val="90000"/>
+              </a:lnSpc>
+              <a:spcBef>
+                <a:spcPts val="500"/>
+              </a:spcBef>
+              <a:buFont typeface="Arial" panose="020B0604020202020204" pitchFamily="34" charset="0"/>
+              <a:buChar char="•"/>
+              <a:defRPr sz="1800" kern="1200">
+                <a:solidFill>
+                  <a:schemeClr val="tx1"/>
+                </a:solidFill>
+                <a:latin typeface="+mn-lt"/>
+                <a:ea typeface="+mn-ea"/>
+                <a:cs typeface="+mn-cs"/>
+              </a:defRPr>
+            </a:lvl5pPr>
+            <a:lvl6pPr marL="2514600" indent="-228600" algn="l" defTabSz="914400" rtl="0" eaLnBrk="1" latinLnBrk="0" hangingPunct="1">
+              <a:lnSpc>
+                <a:spcPct val="90000"/>
+              </a:lnSpc>
+              <a:spcBef>
+                <a:spcPts val="500"/>
+              </a:spcBef>
+              <a:buFont typeface="Arial" panose="020B0604020202020204" pitchFamily="34" charset="0"/>
+              <a:buChar char="•"/>
+              <a:defRPr sz="1800" kern="1200">
+                <a:solidFill>
+                  <a:schemeClr val="tx1"/>
+                </a:solidFill>
+                <a:latin typeface="+mn-lt"/>
+                <a:ea typeface="+mn-ea"/>
+                <a:cs typeface="+mn-cs"/>
+              </a:defRPr>
+            </a:lvl6pPr>
+            <a:lvl7pPr marL="2971800" indent="-228600" algn="l" defTabSz="914400" rtl="0" eaLnBrk="1" latinLnBrk="0" hangingPunct="1">
+              <a:lnSpc>
+                <a:spcPct val="90000"/>
+              </a:lnSpc>
+              <a:spcBef>
+                <a:spcPts val="500"/>
+              </a:spcBef>
+              <a:buFont typeface="Arial" panose="020B0604020202020204" pitchFamily="34" charset="0"/>
+              <a:buChar char="•"/>
+              <a:defRPr sz="1800" kern="1200">
+                <a:solidFill>
+                  <a:schemeClr val="tx1"/>
+                </a:solidFill>
+                <a:latin typeface="+mn-lt"/>
+                <a:ea typeface="+mn-ea"/>
+                <a:cs typeface="+mn-cs"/>
+              </a:defRPr>
+            </a:lvl7pPr>
+            <a:lvl8pPr marL="3429000" indent="-228600" algn="l" defTabSz="914400" rtl="0" eaLnBrk="1" latinLnBrk="0" hangingPunct="1">
+              <a:lnSpc>
+                <a:spcPct val="90000"/>
+              </a:lnSpc>
+              <a:spcBef>
+                <a:spcPts val="500"/>
+              </a:spcBef>
+              <a:buFont typeface="Arial" panose="020B0604020202020204" pitchFamily="34" charset="0"/>
+              <a:buChar char="•"/>
+              <a:defRPr sz="1800" kern="1200">
+                <a:solidFill>
+                  <a:schemeClr val="tx1"/>
+                </a:solidFill>
+                <a:latin typeface="+mn-lt"/>
+                <a:ea typeface="+mn-ea"/>
+                <a:cs typeface="+mn-cs"/>
+              </a:defRPr>
+            </a:lvl8pPr>
+            <a:lvl9pPr marL="3886200" indent="-228600" algn="l" defTabSz="914400" rtl="0" eaLnBrk="1" latinLnBrk="0" hangingPunct="1">
+              <a:lnSpc>
+                <a:spcPct val="90000"/>
+              </a:lnSpc>
+              <a:spcBef>
+                <a:spcPts val="500"/>
+              </a:spcBef>
+              <a:buFont typeface="Arial" panose="020B0604020202020204" pitchFamily="34" charset="0"/>
+              <a:buChar char="•"/>
+              <a:defRPr sz="1800" kern="1200">
+                <a:solidFill>
+                  <a:schemeClr val="tx1"/>
+                </a:solidFill>
+                <a:latin typeface="+mn-lt"/>
+                <a:ea typeface="+mn-ea"/>
+                <a:cs typeface="+mn-cs"/>
+              </a:defRPr>
+            </a:lvl9pPr>
+          </a:lstStyle>
+          <a:p>
+            <a:pPr marL="0" indent="0">
+              <a:buNone/>
+            </a:pPr>
+            <a:r>
+              <a:rPr lang="en-SG" b="1" dirty="0" smtClean="0">
+                <a:latin typeface="Arial" panose="020B0604020202020204" pitchFamily="34" charset="0"/>
+                <a:cs typeface="Arial" panose="020B0604020202020204" pitchFamily="34" charset="0"/>
+              </a:rPr>
+              <a:t>SOURCE CODE</a:t>
+            </a:r>
+            <a:endParaRPr lang="en-SG" b="1" dirty="0">
+              <a:latin typeface="Arial" panose="020B0604020202020204" pitchFamily="34" charset="0"/>
+              <a:cs typeface="Arial" panose="020B0604020202020204" pitchFamily="34" charset="0"/>
+            </a:endParaRPr>
+          </a:p>
+        </p:txBody>
+      </p:sp>
+      <p:pic>
+        <p:nvPicPr>
+          <p:cNvPr id="4" name="Google Shape;365;p25">
+            <a:hlinkClick r:id="rId2"/>
+          </p:cNvPr>
+          <p:cNvPicPr preferRelativeResize="0"/>
+          <p:nvPr/>
+        </p:nvPicPr>
+        <p:blipFill>
+          <a:blip r:embed="rId3">
+            <a:alphaModFix/>
+          </a:blip>
+          <a:stretch>
+            <a:fillRect/>
+          </a:stretch>
+        </p:blipFill>
+        <p:spPr>
+          <a:xfrm>
+            <a:off x="7579843" y="1146048"/>
+            <a:ext cx="4527350" cy="3763350"/>
+          </a:xfrm>
+          <a:prstGeom prst="rect">
+            <a:avLst/>
+          </a:prstGeom>
+          <a:noFill/>
+          <a:ln>
+            <a:noFill/>
+          </a:ln>
+        </p:spPr>
+      </p:pic>
+      <p:sp>
+        <p:nvSpPr>
+          <p:cNvPr id="2" name="TextBox 1"/>
+          <p:cNvSpPr txBox="1"/>
+          <p:nvPr/>
+        </p:nvSpPr>
+        <p:spPr>
+          <a:xfrm>
+            <a:off x="639194" y="2827668"/>
+            <a:ext cx="6724918" cy="400110"/>
+          </a:xfrm>
+          <a:prstGeom prst="rect">
+            <a:avLst/>
+          </a:prstGeom>
+          <a:noFill/>
+        </p:spPr>
+        <p:txBody>
+          <a:bodyPr wrap="none" rtlCol="0">
+            <a:spAutoFit/>
+          </a:bodyPr>
+          <a:lstStyle/>
+          <a:p>
+            <a:r>
+              <a:rPr lang="en-SG" sz="2000" dirty="0">
+                <a:latin typeface="Arial" panose="020B0604020202020204" pitchFamily="34" charset="0"/>
+                <a:cs typeface="Arial" panose="020B0604020202020204" pitchFamily="34" charset="0"/>
+              </a:rPr>
+              <a:t>Link: </a:t>
+            </a:r>
+            <a:r>
+              <a:rPr lang="en-SG" sz="2000" dirty="0">
+                <a:latin typeface="Arial" panose="020B0604020202020204" pitchFamily="34" charset="0"/>
+                <a:cs typeface="Arial" panose="020B0604020202020204" pitchFamily="34" charset="0"/>
+                <a:hlinkClick r:id="rId4"/>
+              </a:rPr>
+              <a:t>https://github.com/KyAnhNguyen/2022_T4_Nhom13</a:t>
+            </a:r>
+            <a:endParaRPr lang="en-SG" sz="2000" dirty="0">
+              <a:latin typeface="Arial" panose="020B0604020202020204" pitchFamily="34" charset="0"/>
+              <a:cs typeface="Arial" panose="020B0604020202020204" pitchFamily="34" charset="0"/>
+            </a:endParaRPr>
+          </a:p>
+        </p:txBody>
+      </p:sp>
+    </p:spTree>
+    <p:extLst>
+      <p:ext uri="{BB962C8B-B14F-4D97-AF65-F5344CB8AC3E}">
+        <p14:creationId xmlns:p14="http://schemas.microsoft.com/office/powerpoint/2010/main" val="6362153"/>
+      </p:ext>
+    </p:extLst>
+  </p:cSld>
+  <p:clrMapOvr>
+    <a:masterClrMapping/>
+  </p:clrMapOvr>
+</p:sld>
+</file>
+
+<file path=ppt/slides/slide11.xml><?xml version="1.0" encoding="utf-8"?>
+<p:sld xmlns:a="http://schemas.openxmlformats.org/drawingml/2006/main" xmlns:r="http://schemas.openxmlformats.org/officeDocument/2006/relationships" xmlns:p="http://schemas.openxmlformats.org/presentationml/2006/main">
+  <p:cSld>
+    <p:spTree>
+      <p:nvGrpSpPr>
+        <p:cNvPr id="1" name=""/>
+        <p:cNvGrpSpPr/>
+        <p:nvPr/>
+      </p:nvGrpSpPr>
+      <p:grpSpPr>
+        <a:xfrm>
+          <a:off x="0" y="0"/>
+          <a:ext cx="0" cy="0"/>
+          <a:chOff x="0" y="0"/>
+          <a:chExt cx="0" cy="0"/>
+        </a:xfrm>
+      </p:grpSpPr>
+      <p:sp>
+        <p:nvSpPr>
+          <p:cNvPr id="3" name="Subtitle 2"/>
+          <p:cNvSpPr txBox="1">
+            <a:spLocks/>
+          </p:cNvSpPr>
+          <p:nvPr/>
+        </p:nvSpPr>
+        <p:spPr>
+          <a:xfrm>
+            <a:off x="152398" y="198436"/>
+            <a:ext cx="7698511" cy="466582"/>
+          </a:xfrm>
+          <a:prstGeom prst="rect">
+            <a:avLst/>
+          </a:prstGeom>
+        </p:spPr>
+        <p:txBody>
+          <a:bodyPr vert="horz" lIns="91440" tIns="45720" rIns="91440" bIns="45720" rtlCol="0">
+            <a:normAutofit lnSpcReduction="10000"/>
+          </a:bodyPr>
+          <a:lstStyle>
+            <a:lvl1pPr marL="228600" indent="-228600" algn="l" defTabSz="914400" rtl="0" eaLnBrk="1" latinLnBrk="0" hangingPunct="1">
+              <a:lnSpc>
+                <a:spcPct val="90000"/>
+              </a:lnSpc>
+              <a:spcBef>
+                <a:spcPts val="1000"/>
+              </a:spcBef>
+              <a:buFont typeface="Arial" panose="020B0604020202020204" pitchFamily="34" charset="0"/>
+              <a:buChar char="•"/>
+              <a:defRPr sz="2800" kern="1200">
+                <a:solidFill>
+                  <a:schemeClr val="tx1"/>
+                </a:solidFill>
+                <a:latin typeface="+mn-lt"/>
+                <a:ea typeface="+mn-ea"/>
+                <a:cs typeface="+mn-cs"/>
+              </a:defRPr>
+            </a:lvl1pPr>
+            <a:lvl2pPr marL="685800" indent="-228600" algn="l" defTabSz="914400" rtl="0" eaLnBrk="1" latinLnBrk="0" hangingPunct="1">
+              <a:lnSpc>
+                <a:spcPct val="90000"/>
+              </a:lnSpc>
+              <a:spcBef>
+                <a:spcPts val="500"/>
+              </a:spcBef>
+              <a:buFont typeface="Arial" panose="020B0604020202020204" pitchFamily="34" charset="0"/>
+              <a:buChar char="•"/>
+              <a:defRPr sz="2400" kern="1200">
+                <a:solidFill>
+                  <a:schemeClr val="tx1"/>
+                </a:solidFill>
+                <a:latin typeface="+mn-lt"/>
+                <a:ea typeface="+mn-ea"/>
+                <a:cs typeface="+mn-cs"/>
+              </a:defRPr>
+            </a:lvl2pPr>
+            <a:lvl3pPr marL="1143000" indent="-228600" algn="l" defTabSz="914400" rtl="0" eaLnBrk="1" latinLnBrk="0" hangingPunct="1">
+              <a:lnSpc>
+                <a:spcPct val="90000"/>
+              </a:lnSpc>
+              <a:spcBef>
+                <a:spcPts val="500"/>
+              </a:spcBef>
+              <a:buFont typeface="Arial" panose="020B0604020202020204" pitchFamily="34" charset="0"/>
+              <a:buChar char="•"/>
+              <a:defRPr sz="2000" kern="1200">
+                <a:solidFill>
+                  <a:schemeClr val="tx1"/>
+                </a:solidFill>
+                <a:latin typeface="+mn-lt"/>
+                <a:ea typeface="+mn-ea"/>
+                <a:cs typeface="+mn-cs"/>
+              </a:defRPr>
+            </a:lvl3pPr>
+            <a:lvl4pPr marL="1600200" indent="-228600" algn="l" defTabSz="914400" rtl="0" eaLnBrk="1" latinLnBrk="0" hangingPunct="1">
+              <a:lnSpc>
+                <a:spcPct val="90000"/>
+              </a:lnSpc>
+              <a:spcBef>
+                <a:spcPts val="500"/>
+              </a:spcBef>
+              <a:buFont typeface="Arial" panose="020B0604020202020204" pitchFamily="34" charset="0"/>
+              <a:buChar char="•"/>
+              <a:defRPr sz="1800" kern="1200">
+                <a:solidFill>
+                  <a:schemeClr val="tx1"/>
+                </a:solidFill>
+                <a:latin typeface="+mn-lt"/>
+                <a:ea typeface="+mn-ea"/>
+                <a:cs typeface="+mn-cs"/>
+              </a:defRPr>
+            </a:lvl4pPr>
+            <a:lvl5pPr marL="2057400" indent="-228600" algn="l" defTabSz="914400" rtl="0" eaLnBrk="1" latinLnBrk="0" hangingPunct="1">
+              <a:lnSpc>
+                <a:spcPct val="90000"/>
+              </a:lnSpc>
+              <a:spcBef>
+                <a:spcPts val="500"/>
+              </a:spcBef>
+              <a:buFont typeface="Arial" panose="020B0604020202020204" pitchFamily="34" charset="0"/>
+              <a:buChar char="•"/>
+              <a:defRPr sz="1800" kern="1200">
+                <a:solidFill>
+                  <a:schemeClr val="tx1"/>
+                </a:solidFill>
+                <a:latin typeface="+mn-lt"/>
+                <a:ea typeface="+mn-ea"/>
+                <a:cs typeface="+mn-cs"/>
+              </a:defRPr>
+            </a:lvl5pPr>
+            <a:lvl6pPr marL="2514600" indent="-228600" algn="l" defTabSz="914400" rtl="0" eaLnBrk="1" latinLnBrk="0" hangingPunct="1">
+              <a:lnSpc>
+                <a:spcPct val="90000"/>
+              </a:lnSpc>
+              <a:spcBef>
+                <a:spcPts val="500"/>
+              </a:spcBef>
+              <a:buFont typeface="Arial" panose="020B0604020202020204" pitchFamily="34" charset="0"/>
+              <a:buChar char="•"/>
+              <a:defRPr sz="1800" kern="1200">
+                <a:solidFill>
+                  <a:schemeClr val="tx1"/>
+                </a:solidFill>
+                <a:latin typeface="+mn-lt"/>
+                <a:ea typeface="+mn-ea"/>
+                <a:cs typeface="+mn-cs"/>
+              </a:defRPr>
+            </a:lvl6pPr>
+            <a:lvl7pPr marL="2971800" indent="-228600" algn="l" defTabSz="914400" rtl="0" eaLnBrk="1" latinLnBrk="0" hangingPunct="1">
+              <a:lnSpc>
+                <a:spcPct val="90000"/>
+              </a:lnSpc>
+              <a:spcBef>
+                <a:spcPts val="500"/>
+              </a:spcBef>
+              <a:buFont typeface="Arial" panose="020B0604020202020204" pitchFamily="34" charset="0"/>
+              <a:buChar char="•"/>
+              <a:defRPr sz="1800" kern="1200">
+                <a:solidFill>
+                  <a:schemeClr val="tx1"/>
+                </a:solidFill>
+                <a:latin typeface="+mn-lt"/>
+                <a:ea typeface="+mn-ea"/>
+                <a:cs typeface="+mn-cs"/>
+              </a:defRPr>
+            </a:lvl7pPr>
+            <a:lvl8pPr marL="3429000" indent="-228600" algn="l" defTabSz="914400" rtl="0" eaLnBrk="1" latinLnBrk="0" hangingPunct="1">
+              <a:lnSpc>
+                <a:spcPct val="90000"/>
+              </a:lnSpc>
+              <a:spcBef>
+                <a:spcPts val="500"/>
+              </a:spcBef>
+              <a:buFont typeface="Arial" panose="020B0604020202020204" pitchFamily="34" charset="0"/>
+              <a:buChar char="•"/>
+              <a:defRPr sz="1800" kern="1200">
+                <a:solidFill>
+                  <a:schemeClr val="tx1"/>
+                </a:solidFill>
+                <a:latin typeface="+mn-lt"/>
+                <a:ea typeface="+mn-ea"/>
+                <a:cs typeface="+mn-cs"/>
+              </a:defRPr>
+            </a:lvl8pPr>
+            <a:lvl9pPr marL="3886200" indent="-228600" algn="l" defTabSz="914400" rtl="0" eaLnBrk="1" latinLnBrk="0" hangingPunct="1">
+              <a:lnSpc>
+                <a:spcPct val="90000"/>
+              </a:lnSpc>
+              <a:spcBef>
+                <a:spcPts val="500"/>
+              </a:spcBef>
+              <a:buFont typeface="Arial" panose="020B0604020202020204" pitchFamily="34" charset="0"/>
+              <a:buChar char="•"/>
+              <a:defRPr sz="1800" kern="1200">
+                <a:solidFill>
+                  <a:schemeClr val="tx1"/>
+                </a:solidFill>
+                <a:latin typeface="+mn-lt"/>
+                <a:ea typeface="+mn-ea"/>
+                <a:cs typeface="+mn-cs"/>
+              </a:defRPr>
+            </a:lvl9pPr>
+          </a:lstStyle>
+          <a:p>
+            <a:pPr marL="0" indent="0">
+              <a:buNone/>
+            </a:pPr>
+            <a:r>
+              <a:rPr lang="en-SG" b="1" dirty="0" smtClean="0">
+                <a:latin typeface="Arial" panose="020B0604020202020204" pitchFamily="34" charset="0"/>
+                <a:cs typeface="Arial" panose="020B0604020202020204" pitchFamily="34" charset="0"/>
+              </a:rPr>
+              <a:t>THÀNH VIÊN</a:t>
+            </a:r>
+            <a:endParaRPr lang="en-SG" b="1" dirty="0">
+              <a:latin typeface="Arial" panose="020B0604020202020204" pitchFamily="34" charset="0"/>
+              <a:cs typeface="Arial" panose="020B0604020202020204" pitchFamily="34" charset="0"/>
+            </a:endParaRPr>
+          </a:p>
+        </p:txBody>
+      </p:sp>
+    </p:spTree>
+    <p:extLst>
+      <p:ext uri="{BB962C8B-B14F-4D97-AF65-F5344CB8AC3E}">
+        <p14:creationId xmlns:p14="http://schemas.microsoft.com/office/powerpoint/2010/main" val="49059106"/>
+      </p:ext>
+    </p:extLst>
+  </p:cSld>
+  <p:clrMapOvr>
+    <a:masterClrMapping/>
+  </p:clrMapOvr>
 </p:sld>
 </file>
 
@@ -4337,7 +4837,7 @@
           <p:nvPr>
             <p:extLst>
               <p:ext uri="{D42A27DB-BD31-4B8C-83A1-F6EECF244321}">
-                <p14:modId xmlns:p14="http://schemas.microsoft.com/office/powerpoint/2010/main" val="1505465117"/>
+                <p14:modId xmlns:p14="http://schemas.microsoft.com/office/powerpoint/2010/main" val="3759915472"/>
               </p:ext>
             </p:extLst>
           </p:nvPr>
@@ -4415,7 +4915,7 @@
                       </a:r>
                       <a:r>
                         <a:rPr lang="en-SG" baseline="0" dirty="0" smtClean="0"/>
-                        <a:t> đồ cấu trúc</a:t>
+                        <a:t> đồ kiến trúc</a:t>
                       </a:r>
                       <a:endParaRPr lang="en-SG" dirty="0"/>
                     </a:p>
@@ -4580,6 +5080,13 @@
   <p:clrMapOvr>
     <a:masterClrMapping/>
   </p:clrMapOvr>
+  <p:timing>
+    <p:tnLst>
+      <p:par>
+        <p:cTn id="1" dur="indefinite" restart="never" nodeType="tmRoot"/>
+      </p:par>
+    </p:tnLst>
+  </p:timing>
 </p:sld>
 </file>
 
@@ -4794,7 +5301,7 @@
                 <a:latin typeface="Arial" panose="020B0604020202020204" pitchFamily="34" charset="0"/>
                 <a:cs typeface="Arial" panose="020B0604020202020204" pitchFamily="34" charset="0"/>
               </a:rPr>
-              <a:t>SƠ ĐỒ CẤU TRÚC</a:t>
+              <a:t>SƠ ĐỒ KIẾN TRÚC</a:t>
             </a:r>
             <a:endParaRPr lang="en-SG" b="1" dirty="0">
               <a:latin typeface="Arial" panose="020B0604020202020204" pitchFamily="34" charset="0"/>
@@ -4803,6 +5310,36 @@
           </a:p>
         </p:txBody>
       </p:sp>
+      <p:pic>
+        <p:nvPicPr>
+          <p:cNvPr id="2" name="Picture 1"/>
+          <p:cNvPicPr>
+            <a:picLocks noChangeAspect="1"/>
+          </p:cNvPicPr>
+          <p:nvPr/>
+        </p:nvPicPr>
+        <p:blipFill>
+          <a:blip r:embed="rId2" cstate="print">
+            <a:extLst>
+              <a:ext uri="{28A0092B-C50C-407E-A947-70E740481C1C}">
+                <a14:useLocalDpi xmlns:a14="http://schemas.microsoft.com/office/drawing/2010/main" val="0"/>
+              </a:ext>
+            </a:extLst>
+          </a:blip>
+          <a:stretch>
+            <a:fillRect/>
+          </a:stretch>
+        </p:blipFill>
+        <p:spPr>
+          <a:xfrm>
+            <a:off x="0" y="1788803"/>
+            <a:ext cx="12192000" cy="3280393"/>
+          </a:xfrm>
+          <a:prstGeom prst="rect">
+            <a:avLst/>
+          </a:prstGeom>
+        </p:spPr>
+      </p:pic>
     </p:spTree>
     <p:extLst>
       <p:ext uri="{BB962C8B-B14F-4D97-AF65-F5344CB8AC3E}">
@@ -4813,6 +5350,13 @@
   <p:clrMapOvr>
     <a:masterClrMapping/>
   </p:clrMapOvr>
+  <p:timing>
+    <p:tnLst>
+      <p:par>
+        <p:cTn id="1" dur="indefinite" restart="never" nodeType="tmRoot"/>
+      </p:par>
+    </p:tnLst>
+  </p:timing>
 </p:sld>
 </file>
 
@@ -5106,6 +5650,13 @@
   <p:clrMapOvr>
     <a:masterClrMapping/>
   </p:clrMapOvr>
+  <p:timing>
+    <p:tnLst>
+      <p:par>
+        <p:cTn id="1" dur="indefinite" restart="never" nodeType="tmRoot"/>
+      </p:par>
+    </p:tnLst>
+  </p:timing>
 </p:sld>
 </file>
 
@@ -5353,6 +5904,36 @@
           <a:xfrm>
             <a:off x="361520" y="665018"/>
             <a:ext cx="4949389" cy="6107382"/>
+          </a:xfrm>
+          <a:prstGeom prst="rect">
+            <a:avLst/>
+          </a:prstGeom>
+        </p:spPr>
+      </p:pic>
+      <p:pic>
+        <p:nvPicPr>
+          <p:cNvPr id="5" name="Picture 4"/>
+          <p:cNvPicPr>
+            <a:picLocks noChangeAspect="1"/>
+          </p:cNvPicPr>
+          <p:nvPr/>
+        </p:nvPicPr>
+        <p:blipFill>
+          <a:blip r:embed="rId3">
+            <a:extLst>
+              <a:ext uri="{28A0092B-C50C-407E-A947-70E740481C1C}">
+                <a14:useLocalDpi xmlns:a14="http://schemas.microsoft.com/office/drawing/2010/main" val="0"/>
+              </a:ext>
+            </a:extLst>
+          </a:blip>
+          <a:stretch>
+            <a:fillRect/>
+          </a:stretch>
+        </p:blipFill>
+        <p:spPr>
+          <a:xfrm>
+            <a:off x="6374394" y="653623"/>
+            <a:ext cx="4958624" cy="6118777"/>
           </a:xfrm>
           <a:prstGeom prst="rect">
             <a:avLst/>
@@ -5592,10 +6173,70 @@
           </a:p>
         </p:txBody>
       </p:sp>
+      <p:pic>
+        <p:nvPicPr>
+          <p:cNvPr id="2" name="Picture 1"/>
+          <p:cNvPicPr>
+            <a:picLocks noChangeAspect="1"/>
+          </p:cNvPicPr>
+          <p:nvPr/>
+        </p:nvPicPr>
+        <p:blipFill>
+          <a:blip r:embed="rId2">
+            <a:extLst>
+              <a:ext uri="{28A0092B-C50C-407E-A947-70E740481C1C}">
+                <a14:useLocalDpi xmlns:a14="http://schemas.microsoft.com/office/drawing/2010/main" val="0"/>
+              </a:ext>
+            </a:extLst>
+          </a:blip>
+          <a:stretch>
+            <a:fillRect/>
+          </a:stretch>
+        </p:blipFill>
+        <p:spPr>
+          <a:xfrm>
+            <a:off x="630436" y="734183"/>
+            <a:ext cx="3553638" cy="6003743"/>
+          </a:xfrm>
+          <a:prstGeom prst="rect">
+            <a:avLst/>
+          </a:prstGeom>
+        </p:spPr>
+      </p:pic>
+      <p:pic>
+        <p:nvPicPr>
+          <p:cNvPr id="4" name="Picture 3"/>
+          <p:cNvPicPr>
+            <a:picLocks noChangeAspect="1"/>
+          </p:cNvPicPr>
+          <p:nvPr/>
+        </p:nvPicPr>
+        <p:blipFill>
+          <a:blip r:embed="rId3">
+            <a:extLst>
+              <a:ext uri="{28A0092B-C50C-407E-A947-70E740481C1C}">
+                <a14:useLocalDpi xmlns:a14="http://schemas.microsoft.com/office/drawing/2010/main" val="0"/>
+              </a:ext>
+            </a:extLst>
+          </a:blip>
+          <a:stretch>
+            <a:fillRect/>
+          </a:stretch>
+        </p:blipFill>
+        <p:spPr>
+          <a:xfrm>
+            <a:off x="6292872" y="662724"/>
+            <a:ext cx="4134983" cy="6075201"/>
+          </a:xfrm>
+          <a:prstGeom prst="rect">
+            <a:avLst/>
+          </a:prstGeom>
+        </p:spPr>
+      </p:pic>
     </p:spTree>
     <p:extLst>
       <p:ext uri="{BB962C8B-B14F-4D97-AF65-F5344CB8AC3E}">
-        <p14:creationId xmlns:p14="http://schemas.microsoft.com/office/powerpoint/2010/main" val="2915572374"/>
+        <p14:creationId xmlns:p14="http://schemas.microsoft.com/office/powerpoint/2010/main" val="1007551862"/>
       </p:ext>
     </p:extLst>
   </p:cSld>
@@ -5816,7 +6457,7 @@
                 <a:latin typeface="Arial" panose="020B0604020202020204" pitchFamily="34" charset="0"/>
                 <a:cs typeface="Arial" panose="020B0604020202020204" pitchFamily="34" charset="0"/>
               </a:rPr>
-              <a:t>SOURCE CODE</a:t>
+              <a:t>WORKFLOW</a:t>
             </a:r>
             <a:endParaRPr lang="en-SG" b="1" dirty="0">
               <a:latin typeface="Arial" panose="020B0604020202020204" pitchFamily="34" charset="0"/>
@@ -5827,15 +6468,19 @@
       </p:sp>
       <p:pic>
         <p:nvPicPr>
-          <p:cNvPr id="4" name="Google Shape;365;p25">
-            <a:hlinkClick r:id="rId2"/>
-          </p:cNvPr>
-          <p:cNvPicPr preferRelativeResize="0"/>
+          <p:cNvPr id="2" name="Picture 1"/>
+          <p:cNvPicPr>
+            <a:picLocks noChangeAspect="1"/>
+          </p:cNvPicPr>
           <p:nvPr/>
         </p:nvPicPr>
         <p:blipFill>
-          <a:blip r:embed="rId3">
-            <a:alphaModFix/>
+          <a:blip r:embed="rId2">
+            <a:extLst>
+              <a:ext uri="{28A0092B-C50C-407E-A947-70E740481C1C}">
+                <a14:useLocalDpi xmlns:a14="http://schemas.microsoft.com/office/drawing/2010/main" val="0"/>
+              </a:ext>
+            </a:extLst>
           </a:blip>
           <a:stretch>
             <a:fillRect/>
@@ -5843,66 +6488,48 @@
         </p:blipFill>
         <p:spPr>
           <a:xfrm>
-            <a:off x="7579843" y="1146048"/>
-            <a:ext cx="4527350" cy="3763350"/>
+            <a:off x="538162" y="997527"/>
+            <a:ext cx="5215529" cy="5683250"/>
           </a:xfrm>
           <a:prstGeom prst="rect">
             <a:avLst/>
           </a:prstGeom>
-          <a:noFill/>
-          <a:ln>
-            <a:noFill/>
-          </a:ln>
         </p:spPr>
       </p:pic>
-      <p:sp>
-        <p:nvSpPr>
-          <p:cNvPr id="2" name="TextBox 1"/>
-          <p:cNvSpPr txBox="1"/>
+      <p:pic>
+        <p:nvPicPr>
+          <p:cNvPr id="5" name="Picture 4"/>
+          <p:cNvPicPr>
+            <a:picLocks noChangeAspect="1"/>
+          </p:cNvPicPr>
           <p:nvPr/>
-        </p:nvSpPr>
+        </p:nvPicPr>
+        <p:blipFill>
+          <a:blip r:embed="rId3">
+            <a:extLst>
+              <a:ext uri="{28A0092B-C50C-407E-A947-70E740481C1C}">
+                <a14:useLocalDpi xmlns:a14="http://schemas.microsoft.com/office/drawing/2010/main" val="0"/>
+              </a:ext>
+            </a:extLst>
+          </a:blip>
+          <a:stretch>
+            <a:fillRect/>
+          </a:stretch>
+        </p:blipFill>
         <p:spPr>
           <a:xfrm>
-            <a:off x="639194" y="2827668"/>
-            <a:ext cx="6724918" cy="400110"/>
+            <a:off x="6412483" y="996913"/>
+            <a:ext cx="5216093" cy="5683864"/>
           </a:xfrm>
           <a:prstGeom prst="rect">
             <a:avLst/>
           </a:prstGeom>
-          <a:noFill/>
         </p:spPr>
-        <p:txBody>
-          <a:bodyPr wrap="none" rtlCol="0">
-            <a:spAutoFit/>
-          </a:bodyPr>
-          <a:lstStyle/>
-          <a:p>
-            <a:r>
-              <a:rPr lang="en-SG" sz="2000" dirty="0">
-                <a:latin typeface="Arial" panose="020B0604020202020204" pitchFamily="34" charset="0"/>
-                <a:cs typeface="Arial" panose="020B0604020202020204" pitchFamily="34" charset="0"/>
-              </a:rPr>
-              <a:t>Link: </a:t>
-            </a:r>
-            <a:r>
-              <a:rPr lang="en-SG" sz="2000" dirty="0">
-                <a:latin typeface="Arial" panose="020B0604020202020204" pitchFamily="34" charset="0"/>
-                <a:cs typeface="Arial" panose="020B0604020202020204" pitchFamily="34" charset="0"/>
-                <a:hlinkClick r:id="rId4"/>
-              </a:rPr>
-              <a:t>https://github.com/KyAnhNguyen/2022_T4_Nhom13</a:t>
-            </a:r>
-            <a:endParaRPr lang="en-SG" sz="2000" dirty="0">
-              <a:latin typeface="Arial" panose="020B0604020202020204" pitchFamily="34" charset="0"/>
-              <a:cs typeface="Arial" panose="020B0604020202020204" pitchFamily="34" charset="0"/>
-            </a:endParaRPr>
-          </a:p>
-        </p:txBody>
-      </p:sp>
+      </p:pic>
     </p:spTree>
     <p:extLst>
       <p:ext uri="{BB962C8B-B14F-4D97-AF65-F5344CB8AC3E}">
-        <p14:creationId xmlns:p14="http://schemas.microsoft.com/office/powerpoint/2010/main" val="6362153"/>
+        <p14:creationId xmlns:p14="http://schemas.microsoft.com/office/powerpoint/2010/main" val="2724792245"/>
       </p:ext>
     </p:extLst>
   </p:cSld>
@@ -6123,7 +6750,7 @@
                 <a:latin typeface="Arial" panose="020B0604020202020204" pitchFamily="34" charset="0"/>
                 <a:cs typeface="Arial" panose="020B0604020202020204" pitchFamily="34" charset="0"/>
               </a:rPr>
-              <a:t>THÀNH VIÊN</a:t>
+              <a:t>COMPONENT DIAGRAM</a:t>
             </a:r>
             <a:endParaRPr lang="en-SG" b="1" dirty="0">
               <a:latin typeface="Arial" panose="020B0604020202020204" pitchFamily="34" charset="0"/>
@@ -6135,7 +6762,7 @@
     </p:spTree>
     <p:extLst>
       <p:ext uri="{BB962C8B-B14F-4D97-AF65-F5344CB8AC3E}">
-        <p14:creationId xmlns:p14="http://schemas.microsoft.com/office/powerpoint/2010/main" val="49059106"/>
+        <p14:creationId xmlns:p14="http://schemas.microsoft.com/office/powerpoint/2010/main" val="2915572374"/>
       </p:ext>
     </p:extLst>
   </p:cSld>

</xml_diff>